<commit_message>
removing and saving applied
</commit_message>
<xml_diff>
--- a/_self/_for_studying/_lab_applying/_ IVC_Lab_Sejong_Univer_Aimed/NgocTrieu_CV.pptx
+++ b/_self/_for_studying/_lab_applying/_ IVC_Lab_Sejong_Univer_Aimed/NgocTrieu_CV.pptx
@@ -1173,7 +1173,7 @@
           </a:ln>
           <a:extLst>
             <a:ext uri="{C572A759-6A51-4108-AA02-DFA0A04FC94B}">
-              <ma14:wrappingTextBoxFlag xmlns:ma14="http://schemas.microsoft.com/office/mac/drawingml/2011/main" xmlns:a14="http://schemas.microsoft.com/office/drawing/2010/main" xmlns:m="http://schemas.openxmlformats.org/officeDocument/2006/math" xmlns="" val="1"/>
+              <ma14:wrappingTextBoxFlag xmlns="" xmlns:m="http://schemas.openxmlformats.org/officeDocument/2006/math" xmlns:a14="http://schemas.microsoft.com/office/drawing/2010/main" xmlns:ma14="http://schemas.microsoft.com/office/mac/drawingml/2011/main" val="1"/>
             </a:ext>
           </a:extLst>
         </p:spPr>
@@ -1520,7 +1520,7 @@
           </a:ln>
           <a:extLst>
             <a:ext uri="{C572A759-6A51-4108-AA02-DFA0A04FC94B}">
-              <ma14:wrappingTextBoxFlag xmlns:ma14="http://schemas.microsoft.com/office/mac/drawingml/2011/main" xmlns:a14="http://schemas.microsoft.com/office/drawing/2010/main" xmlns:m="http://schemas.openxmlformats.org/officeDocument/2006/math" xmlns="" val="1"/>
+              <ma14:wrappingTextBoxFlag xmlns="" xmlns:m="http://schemas.openxmlformats.org/officeDocument/2006/math" xmlns:a14="http://schemas.microsoft.com/office/drawing/2010/main" xmlns:ma14="http://schemas.microsoft.com/office/mac/drawingml/2011/main" val="1"/>
             </a:ext>
           </a:extLst>
         </p:spPr>
@@ -2529,10 +2529,10 @@
         </p:nvGrpSpPr>
         <p:grpSpPr>
           <a:xfrm>
-            <a:off x="2537041" y="6722755"/>
-            <a:ext cx="4183799" cy="1197828"/>
-            <a:chOff x="285575" y="6278034"/>
-            <a:chExt cx="2295953" cy="1297647"/>
+            <a:off x="2531758" y="6722752"/>
+            <a:ext cx="4189082" cy="1022549"/>
+            <a:chOff x="282676" y="6278034"/>
+            <a:chExt cx="2298852" cy="1107762"/>
           </a:xfrm>
         </p:grpSpPr>
         <p:sp>
@@ -2560,7 +2560,7 @@
             </a:ln>
             <a:extLst>
               <a:ext uri="{C572A759-6A51-4108-AA02-DFA0A04FC94B}">
-                <ma14:wrappingTextBoxFlag xmlns:ma14="http://schemas.microsoft.com/office/mac/drawingml/2011/main" xmlns:a14="http://schemas.microsoft.com/office/drawing/2010/main" xmlns:m="http://schemas.openxmlformats.org/officeDocument/2006/math" xmlns="" val="1"/>
+                <ma14:wrappingTextBoxFlag xmlns="" xmlns:m="http://schemas.openxmlformats.org/officeDocument/2006/math" xmlns:a14="http://schemas.microsoft.com/office/drawing/2010/main" xmlns:ma14="http://schemas.microsoft.com/office/mac/drawingml/2011/main" val="1"/>
               </a:ext>
             </a:extLst>
           </p:spPr>
@@ -2633,8 +2633,8 @@
           </p:nvSpPr>
           <p:spPr>
             <a:xfrm>
-              <a:off x="285575" y="6614120"/>
-              <a:ext cx="2284839" cy="961561"/>
+              <a:off x="282676" y="6649297"/>
+              <a:ext cx="2284839" cy="736499"/>
             </a:xfrm>
             <a:prstGeom prst="rect">
               <a:avLst/>
@@ -2708,27 +2708,6 @@
                   <a:sym typeface="Helvetica Neue Medium"/>
                 </a:rPr>
                 <a:t>Data Structure and Algorithm (Udemy)</a:t>
-              </a:r>
-            </a:p>
-            <a:p>
-              <a:pPr marL="171450" lvl="3" indent="-171450" algn="just">
-                <a:lnSpc>
-                  <a:spcPct val="150000"/>
-                </a:lnSpc>
-                <a:buFont typeface="Arial" panose="020B0604020202020204" pitchFamily="34" charset="0"/>
-                <a:buChar char="•"/>
-              </a:pPr>
-              <a:r>
-                <a:rPr lang="en-US" sz="900" b="0" dirty="0">
-                  <a:solidFill>
-                    <a:schemeClr val="tx1"/>
-                  </a:solidFill>
-                  <a:latin typeface="Arial" panose="020B0604020202020204" pitchFamily="34" charset="0"/>
-                  <a:ea typeface="Calibri" panose="020F0502020204030204" pitchFamily="34" charset="0"/>
-                  <a:cs typeface="Arial" panose="020B0604020202020204" pitchFamily="34" charset="0"/>
-                  <a:sym typeface="Helvetica Neue Medium"/>
-                </a:rPr>
-                <a:t>OpenGL and Shader Programming (Udemy)</a:t>
               </a:r>
             </a:p>
             <a:p>
@@ -2834,7 +2813,7 @@
             </a:ln>
             <a:extLst>
               <a:ext uri="{C572A759-6A51-4108-AA02-DFA0A04FC94B}">
-                <ma14:wrappingTextBoxFlag xmlns:ma14="http://schemas.microsoft.com/office/mac/drawingml/2011/main" xmlns:a14="http://schemas.microsoft.com/office/drawing/2010/main" xmlns:m="http://schemas.openxmlformats.org/officeDocument/2006/math" xmlns="" val="1"/>
+                <ma14:wrappingTextBoxFlag xmlns="" xmlns:m="http://schemas.openxmlformats.org/officeDocument/2006/math" xmlns:a14="http://schemas.microsoft.com/office/drawing/2010/main" xmlns:ma14="http://schemas.microsoft.com/office/mac/drawingml/2011/main" val="1"/>
               </a:ext>
             </a:extLst>
           </p:spPr>
@@ -2882,7 +2861,7 @@
             </a:ln>
             <a:extLst>
               <a:ext uri="{C572A759-6A51-4108-AA02-DFA0A04FC94B}">
-                <ma14:wrappingTextBoxFlag xmlns:ma14="http://schemas.microsoft.com/office/mac/drawingml/2011/main" xmlns:a14="http://schemas.microsoft.com/office/drawing/2010/main" xmlns:m="http://schemas.openxmlformats.org/officeDocument/2006/math" xmlns="" val="1"/>
+                <ma14:wrappingTextBoxFlag xmlns="" xmlns:m="http://schemas.openxmlformats.org/officeDocument/2006/math" xmlns:a14="http://schemas.microsoft.com/office/drawing/2010/main" xmlns:ma14="http://schemas.microsoft.com/office/mac/drawingml/2011/main" val="1"/>
               </a:ext>
             </a:extLst>
           </p:spPr>
@@ -2933,9 +2912,9 @@
         <p:grpSpPr>
           <a:xfrm>
             <a:off x="110867" y="2617470"/>
-            <a:ext cx="2261979" cy="2103136"/>
+            <a:ext cx="2261979" cy="2380135"/>
             <a:chOff x="110867" y="2926080"/>
-            <a:chExt cx="2261979" cy="2103136"/>
+            <a:chExt cx="2261979" cy="2380135"/>
           </a:xfrm>
         </p:grpSpPr>
         <p:sp>
@@ -2957,7 +2936,7 @@
             </a:ln>
             <a:extLst>
               <a:ext uri="{C572A759-6A51-4108-AA02-DFA0A04FC94B}">
-                <ma14:wrappingTextBoxFlag xmlns:ma14="http://schemas.microsoft.com/office/mac/drawingml/2011/main" xmlns:a14="http://schemas.microsoft.com/office/drawing/2010/main" xmlns:m="http://schemas.openxmlformats.org/officeDocument/2006/math" xmlns="" val="1"/>
+                <ma14:wrappingTextBoxFlag xmlns="" xmlns:m="http://schemas.openxmlformats.org/officeDocument/2006/math" xmlns:a14="http://schemas.microsoft.com/office/drawing/2010/main" xmlns:ma14="http://schemas.microsoft.com/office/mac/drawingml/2011/main" val="1"/>
               </a:ext>
             </a:extLst>
           </p:spPr>
@@ -2995,7 +2974,7 @@
           <p:spPr>
             <a:xfrm>
               <a:off x="110867" y="3310625"/>
-              <a:ext cx="2261979" cy="1718591"/>
+              <a:ext cx="2261979" cy="1995590"/>
             </a:xfrm>
             <a:prstGeom prst="rect">
               <a:avLst/>
@@ -3005,7 +2984,7 @@
             </a:ln>
             <a:extLst>
               <a:ext uri="{C572A759-6A51-4108-AA02-DFA0A04FC94B}">
-                <ma14:wrappingTextBoxFlag xmlns:ma14="http://schemas.microsoft.com/office/mac/drawingml/2011/main" xmlns:a14="http://schemas.microsoft.com/office/drawing/2010/main" xmlns:m="http://schemas.openxmlformats.org/officeDocument/2006/math" xmlns="" val="1"/>
+                <ma14:wrappingTextBoxFlag xmlns="" xmlns:m="http://schemas.openxmlformats.org/officeDocument/2006/math" xmlns:a14="http://schemas.microsoft.com/office/drawing/2010/main" xmlns:ma14="http://schemas.microsoft.com/office/mac/drawingml/2011/main" val="1"/>
               </a:ext>
             </a:extLst>
           </p:spPr>
@@ -3045,7 +3024,7 @@
                   <a:latin typeface="Arial" panose="020B0604020202020204" pitchFamily="34" charset="0"/>
                   <a:cs typeface="Arial" panose="020B0604020202020204" pitchFamily="34" charset="0"/>
                 </a:rPr>
-                <a:t>I am driven by my passion for exploring new knowledge and designing distributed, large-scale systems, particularly for cloud computing systems. I am a quick learner, proficient in Python, C++, and can work well under pressure to meet deadlines. </a:t>
+                <a:t>I am driven by my passion for exploring new knowledge and designing distributed, large-scale systems, particularly for the system using image processing and computer vision system. I am a quick learner, proficient in Python, C++, and can work well under pressure to meet deadlines. </a:t>
               </a:r>
             </a:p>
             <a:p>
@@ -3881,7 +3860,7 @@
             </a:ln>
             <a:extLst>
               <a:ext uri="{C572A759-6A51-4108-AA02-DFA0A04FC94B}">
-                <ma14:wrappingTextBoxFlag xmlns:ma14="http://schemas.microsoft.com/office/mac/drawingml/2011/main" xmlns:a14="http://schemas.microsoft.com/office/drawing/2010/main" xmlns:m="http://schemas.openxmlformats.org/officeDocument/2006/math" xmlns="" val="1"/>
+                <ma14:wrappingTextBoxFlag xmlns="" xmlns:m="http://schemas.openxmlformats.org/officeDocument/2006/math" xmlns:a14="http://schemas.microsoft.com/office/drawing/2010/main" xmlns:ma14="http://schemas.microsoft.com/office/mac/drawingml/2011/main" val="1"/>
               </a:ext>
             </a:extLst>
           </p:spPr>
@@ -4230,10 +4209,10 @@
         </p:nvGrpSpPr>
         <p:grpSpPr>
           <a:xfrm>
-            <a:off x="2536072" y="1433637"/>
-            <a:ext cx="4235139" cy="2063032"/>
-            <a:chOff x="2560319" y="1368745"/>
-            <a:chExt cx="4235139" cy="2063032"/>
+            <a:off x="2525888" y="1433637"/>
+            <a:ext cx="4206240" cy="2150907"/>
+            <a:chOff x="2550135" y="1368745"/>
+            <a:chExt cx="4206240" cy="2150907"/>
           </a:xfrm>
         </p:grpSpPr>
         <p:sp>
@@ -4255,7 +4234,7 @@
             </a:ln>
             <a:extLst>
               <a:ext uri="{C572A759-6A51-4108-AA02-DFA0A04FC94B}">
-                <ma14:wrappingTextBoxFlag xmlns:ma14="http://schemas.microsoft.com/office/mac/drawingml/2011/main" xmlns:a14="http://schemas.microsoft.com/office/drawing/2010/main" xmlns:m="http://schemas.openxmlformats.org/officeDocument/2006/math" xmlns="" val="1"/>
+                <ma14:wrappingTextBoxFlag xmlns="" xmlns:m="http://schemas.openxmlformats.org/officeDocument/2006/math" xmlns:a14="http://schemas.microsoft.com/office/drawing/2010/main" xmlns:ma14="http://schemas.microsoft.com/office/mac/drawingml/2011/main" val="1"/>
               </a:ext>
             </a:extLst>
           </p:spPr>
@@ -4329,8 +4308,8 @@
           </p:nvSpPr>
           <p:spPr>
             <a:xfrm>
-              <a:off x="2589218" y="1717225"/>
-              <a:ext cx="4206240" cy="1714552"/>
+              <a:off x="2550135" y="1651661"/>
+              <a:ext cx="4206240" cy="1867991"/>
             </a:xfrm>
             <a:prstGeom prst="rect">
               <a:avLst/>
@@ -4787,7 +4766,7 @@
                   <a:cs typeface="Arial" panose="020B0604020202020204" pitchFamily="34" charset="0"/>
                   <a:sym typeface="Helvetica Neue Medium"/>
                 </a:rPr>
-                <a:t>Created UI using </a:t>
+                <a:t>Created UI on </a:t>
               </a:r>
               <a:r>
                 <a:rPr lang="vi-VN" sz="831" b="0" dirty="0">
@@ -4799,7 +4778,7 @@
                   <a:cs typeface="Arial" panose="020B0604020202020204" pitchFamily="34" charset="0"/>
                   <a:sym typeface="Helvetica Neue Medium"/>
                 </a:rPr>
-                <a:t>Projektor/Qt framework</a:t>
+                <a:t>Projektor/Qt framework with JavaScript for interacting with the service</a:t>
               </a:r>
               <a:r>
                 <a:rPr lang="en-GB" sz="831" b="0" dirty="0">
@@ -4811,7 +4790,7 @@
                   <a:cs typeface="Arial" panose="020B0604020202020204" pitchFamily="34" charset="0"/>
                   <a:sym typeface="Helvetica Neue Medium"/>
                 </a:rPr>
-                <a:t> on Linux Kernel</a:t>
+                <a:t> between font-end and back-end.</a:t>
               </a:r>
             </a:p>
           </p:txBody>
@@ -4856,7 +4835,7 @@
             </a:ln>
             <a:extLst>
               <a:ext uri="{C572A759-6A51-4108-AA02-DFA0A04FC94B}">
-                <ma14:wrappingTextBoxFlag xmlns:ma14="http://schemas.microsoft.com/office/mac/drawingml/2011/main" xmlns:a14="http://schemas.microsoft.com/office/drawing/2010/main" xmlns:m="http://schemas.openxmlformats.org/officeDocument/2006/math" xmlns="" val="1"/>
+                <ma14:wrappingTextBoxFlag xmlns="" xmlns:m="http://schemas.openxmlformats.org/officeDocument/2006/math" xmlns:a14="http://schemas.microsoft.com/office/drawing/2010/main" xmlns:ma14="http://schemas.microsoft.com/office/mac/drawingml/2011/main" val="1"/>
               </a:ext>
             </a:extLst>
           </p:spPr>
@@ -4931,8 +4910,8 @@
           </p:nvSpPr>
           <p:spPr>
             <a:xfrm>
-              <a:off x="294438" y="7195148"/>
-              <a:ext cx="1389395" cy="680199"/>
+              <a:off x="294438" y="7184893"/>
+              <a:ext cx="1389395" cy="830489"/>
             </a:xfrm>
             <a:prstGeom prst="rect">
               <a:avLst/>
@@ -5034,6 +5013,21 @@
                 </a:rPr>
                 <a:t>Java Script</a:t>
               </a:r>
+            </a:p>
+            <a:p>
+              <a:pPr marL="158265" lvl="1" indent="-158265" algn="just">
+                <a:buFont typeface="Arial" panose="020B0604020202020204" pitchFamily="34" charset="0"/>
+                <a:buChar char="•"/>
+              </a:pPr>
+              <a:endParaRPr lang="en-US" sz="831" b="0" dirty="0">
+                <a:solidFill>
+                  <a:schemeClr val="tx1"/>
+                </a:solidFill>
+                <a:latin typeface="Arial" panose="020B0604020202020204" pitchFamily="34" charset="0"/>
+                <a:ea typeface="Calibri" panose="020F0502020204030204" pitchFamily="34" charset="0"/>
+                <a:cs typeface="Arial" panose="020B0604020202020204" pitchFamily="34" charset="0"/>
+                <a:sym typeface="Helvetica Neue Medium"/>
+              </a:endParaRPr>
             </a:p>
           </p:txBody>
         </p:sp>
@@ -5238,7 +5232,7 @@
           </p:nvSpPr>
           <p:spPr>
             <a:xfrm>
-              <a:off x="1720334" y="7187863"/>
+              <a:off x="1713809" y="7184893"/>
               <a:ext cx="1329312" cy="1064065"/>
             </a:xfrm>
             <a:prstGeom prst="rect">
@@ -5444,7 +5438,7 @@
             </a:ln>
             <a:extLst>
               <a:ext uri="{C572A759-6A51-4108-AA02-DFA0A04FC94B}">
-                <ma14:wrappingTextBoxFlag xmlns:ma14="http://schemas.microsoft.com/office/mac/drawingml/2011/main" xmlns:a14="http://schemas.microsoft.com/office/drawing/2010/main" xmlns:m="http://schemas.openxmlformats.org/officeDocument/2006/math" xmlns="" val="1"/>
+                <ma14:wrappingTextBoxFlag xmlns="" xmlns:m="http://schemas.openxmlformats.org/officeDocument/2006/math" xmlns:a14="http://schemas.microsoft.com/office/drawing/2010/main" xmlns:ma14="http://schemas.microsoft.com/office/mac/drawingml/2011/main" val="1"/>
               </a:ext>
             </a:extLst>
           </p:spPr>
@@ -5716,7 +5710,7 @@
               </a:ln>
               <a:extLst>
                 <a:ext uri="{C572A759-6A51-4108-AA02-DFA0A04FC94B}">
-                  <ma14:wrappingTextBoxFlag xmlns:ma14="http://schemas.microsoft.com/office/mac/drawingml/2011/main" xmlns:a14="http://schemas.microsoft.com/office/drawing/2010/main" xmlns:m="http://schemas.openxmlformats.org/officeDocument/2006/math" xmlns="" val="1"/>
+                  <ma14:wrappingTextBoxFlag xmlns="" xmlns:m="http://schemas.openxmlformats.org/officeDocument/2006/math" xmlns:a14="http://schemas.microsoft.com/office/drawing/2010/main" xmlns:ma14="http://schemas.microsoft.com/office/mac/drawingml/2011/main" val="1"/>
                 </a:ext>
               </a:extLst>
             </p:spPr>
@@ -5822,7 +5816,7 @@
             </a:ln>
             <a:extLst>
               <a:ext uri="{C572A759-6A51-4108-AA02-DFA0A04FC94B}">
-                <ma14:wrappingTextBoxFlag xmlns:ma14="http://schemas.microsoft.com/office/mac/drawingml/2011/main" xmlns:a14="http://schemas.microsoft.com/office/drawing/2010/main" xmlns:m="http://schemas.openxmlformats.org/officeDocument/2006/math" xmlns="" val="1"/>
+                <ma14:wrappingTextBoxFlag xmlns="" xmlns:m="http://schemas.openxmlformats.org/officeDocument/2006/math" xmlns:a14="http://schemas.microsoft.com/office/drawing/2010/main" xmlns:ma14="http://schemas.microsoft.com/office/mac/drawingml/2011/main" val="1"/>
               </a:ext>
             </a:extLst>
           </p:spPr>
@@ -6067,10 +6061,10 @@
         </p:nvGrpSpPr>
         <p:grpSpPr>
           <a:xfrm>
-            <a:off x="106919" y="7030720"/>
-            <a:ext cx="2286000" cy="639008"/>
-            <a:chOff x="106919" y="5667273"/>
-            <a:chExt cx="2286000" cy="639008"/>
+            <a:off x="113241" y="7030720"/>
+            <a:ext cx="2286000" cy="837856"/>
+            <a:chOff x="113241" y="5667273"/>
+            <a:chExt cx="2286000" cy="837856"/>
           </a:xfrm>
         </p:grpSpPr>
         <p:sp>
@@ -6098,7 +6092,7 @@
             </a:ln>
             <a:extLst>
               <a:ext uri="{C572A759-6A51-4108-AA02-DFA0A04FC94B}">
-                <ma14:wrappingTextBoxFlag xmlns:ma14="http://schemas.microsoft.com/office/mac/drawingml/2011/main" xmlns:a14="http://schemas.microsoft.com/office/drawing/2010/main" xmlns:m="http://schemas.openxmlformats.org/officeDocument/2006/math" xmlns="" val="1"/>
+                <ma14:wrappingTextBoxFlag xmlns="" xmlns:m="http://schemas.openxmlformats.org/officeDocument/2006/math" xmlns:a14="http://schemas.microsoft.com/office/drawing/2010/main" xmlns:ma14="http://schemas.microsoft.com/office/mac/drawingml/2011/main" val="1"/>
               </a:ext>
             </a:extLst>
           </p:spPr>
@@ -6171,8 +6165,8 @@
           </p:nvSpPr>
           <p:spPr>
             <a:xfrm>
-              <a:off x="106919" y="6041934"/>
-              <a:ext cx="2286000" cy="264347"/>
+              <a:off x="113241" y="6033033"/>
+              <a:ext cx="2286000" cy="472096"/>
             </a:xfrm>
             <a:prstGeom prst="rect">
               <a:avLst/>
@@ -6225,6 +6219,27 @@
                   <a:sym typeface="Helvetica Neue Medium"/>
                 </a:rPr>
                 <a:t>Image Processing and Computer Vision</a:t>
+              </a:r>
+            </a:p>
+            <a:p>
+              <a:pPr marL="171450" indent="-171450" algn="l" defTabSz="556127">
+                <a:lnSpc>
+                  <a:spcPct val="150000"/>
+                </a:lnSpc>
+                <a:buFont typeface="Arial" panose="020B0604020202020204" pitchFamily="34" charset="0"/>
+                <a:buChar char="•"/>
+              </a:pPr>
+              <a:r>
+                <a:rPr lang="en-US" sz="900" b="0" dirty="0">
+                  <a:solidFill>
+                    <a:schemeClr val="tx1"/>
+                  </a:solidFill>
+                  <a:latin typeface="Arial" panose="020B0604020202020204" pitchFamily="34" charset="0"/>
+                  <a:ea typeface="Calibri" panose="020F0502020204030204" pitchFamily="34" charset="0"/>
+                  <a:cs typeface="Arial" panose="020B0604020202020204" pitchFamily="34" charset="0"/>
+                  <a:sym typeface="Helvetica Neue Medium"/>
+                </a:rPr>
+                <a:t>OpenCV Programming with C/C++</a:t>
               </a:r>
             </a:p>
           </p:txBody>

</xml_diff>